<commit_message>
+ imagens, + diagramas
</commit_message>
<xml_diff>
--- a/Figuras TCC/Arquitetura.pptx
+++ b/Figuras TCC/Arquitetura.pptx
@@ -8,6 +8,7 @@
     <p:sldId id="256" r:id="rId2"/>
     <p:sldId id="257" r:id="rId3"/>
     <p:sldId id="258" r:id="rId4"/>
+    <p:sldId id="259" r:id="rId5"/>
   </p:sldIdLst>
   <p:sldSz cx="9144000" cy="6858000" type="screen4x3"/>
   <p:notesSz cx="6858000" cy="9144000"/>
@@ -108,7 +109,7 @@
   </p:defaultTextStyle>
   <p:extLst>
     <p:ext uri="{EFAFB233-063F-42B5-8137-9DF3F51BA10A}">
-      <p15:sldGuideLst xmlns:p15="http://schemas.microsoft.com/office/powerpoint/2012/main">
+      <p15:sldGuideLst xmlns:p15="http://schemas.microsoft.com/office/powerpoint/2012/main" xmlns="">
         <p15:guide id="1" orient="horz" pos="2160">
           <p15:clr>
             <a:srgbClr val="A4A3A4"/>
@@ -306,7 +307,7 @@
           <a:p>
             <a:fld id="{14B35488-3022-4C26-8656-D168FC8EDC0B}" type="datetimeFigureOut">
               <a:rPr lang="pt-BR" smtClean="0"/>
-              <a:t>29/08/2017</a:t>
+              <a:t>30/08/2017</a:t>
             </a:fld>
             <a:endParaRPr lang="pt-BR"/>
           </a:p>
@@ -476,7 +477,7 @@
           <a:p>
             <a:fld id="{14B35488-3022-4C26-8656-D168FC8EDC0B}" type="datetimeFigureOut">
               <a:rPr lang="pt-BR" smtClean="0"/>
-              <a:t>29/08/2017</a:t>
+              <a:t>30/08/2017</a:t>
             </a:fld>
             <a:endParaRPr lang="pt-BR"/>
           </a:p>
@@ -656,7 +657,7 @@
           <a:p>
             <a:fld id="{14B35488-3022-4C26-8656-D168FC8EDC0B}" type="datetimeFigureOut">
               <a:rPr lang="pt-BR" smtClean="0"/>
-              <a:t>29/08/2017</a:t>
+              <a:t>30/08/2017</a:t>
             </a:fld>
             <a:endParaRPr lang="pt-BR"/>
           </a:p>
@@ -826,7 +827,7 @@
           <a:p>
             <a:fld id="{14B35488-3022-4C26-8656-D168FC8EDC0B}" type="datetimeFigureOut">
               <a:rPr lang="pt-BR" smtClean="0"/>
-              <a:t>29/08/2017</a:t>
+              <a:t>30/08/2017</a:t>
             </a:fld>
             <a:endParaRPr lang="pt-BR"/>
           </a:p>
@@ -1072,7 +1073,7 @@
           <a:p>
             <a:fld id="{14B35488-3022-4C26-8656-D168FC8EDC0B}" type="datetimeFigureOut">
               <a:rPr lang="pt-BR" smtClean="0"/>
-              <a:t>29/08/2017</a:t>
+              <a:t>30/08/2017</a:t>
             </a:fld>
             <a:endParaRPr lang="pt-BR"/>
           </a:p>
@@ -1360,7 +1361,7 @@
           <a:p>
             <a:fld id="{14B35488-3022-4C26-8656-D168FC8EDC0B}" type="datetimeFigureOut">
               <a:rPr lang="pt-BR" smtClean="0"/>
-              <a:t>29/08/2017</a:t>
+              <a:t>30/08/2017</a:t>
             </a:fld>
             <a:endParaRPr lang="pt-BR"/>
           </a:p>
@@ -1782,7 +1783,7 @@
           <a:p>
             <a:fld id="{14B35488-3022-4C26-8656-D168FC8EDC0B}" type="datetimeFigureOut">
               <a:rPr lang="pt-BR" smtClean="0"/>
-              <a:t>29/08/2017</a:t>
+              <a:t>30/08/2017</a:t>
             </a:fld>
             <a:endParaRPr lang="pt-BR"/>
           </a:p>
@@ -1900,7 +1901,7 @@
           <a:p>
             <a:fld id="{14B35488-3022-4C26-8656-D168FC8EDC0B}" type="datetimeFigureOut">
               <a:rPr lang="pt-BR" smtClean="0"/>
-              <a:t>29/08/2017</a:t>
+              <a:t>30/08/2017</a:t>
             </a:fld>
             <a:endParaRPr lang="pt-BR"/>
           </a:p>
@@ -1995,7 +1996,7 @@
           <a:p>
             <a:fld id="{14B35488-3022-4C26-8656-D168FC8EDC0B}" type="datetimeFigureOut">
               <a:rPr lang="pt-BR" smtClean="0"/>
-              <a:t>29/08/2017</a:t>
+              <a:t>30/08/2017</a:t>
             </a:fld>
             <a:endParaRPr lang="pt-BR"/>
           </a:p>
@@ -2272,7 +2273,7 @@
           <a:p>
             <a:fld id="{14B35488-3022-4C26-8656-D168FC8EDC0B}" type="datetimeFigureOut">
               <a:rPr lang="pt-BR" smtClean="0"/>
-              <a:t>29/08/2017</a:t>
+              <a:t>30/08/2017</a:t>
             </a:fld>
             <a:endParaRPr lang="pt-BR"/>
           </a:p>
@@ -2525,7 +2526,7 @@
           <a:p>
             <a:fld id="{14B35488-3022-4C26-8656-D168FC8EDC0B}" type="datetimeFigureOut">
               <a:rPr lang="pt-BR" smtClean="0"/>
-              <a:t>29/08/2017</a:t>
+              <a:t>30/08/2017</a:t>
             </a:fld>
             <a:endParaRPr lang="pt-BR"/>
           </a:p>
@@ -2738,7 +2739,7 @@
           <a:p>
             <a:fld id="{14B35488-3022-4C26-8656-D168FC8EDC0B}" type="datetimeFigureOut">
               <a:rPr lang="pt-BR" smtClean="0"/>
-              <a:t>29/08/2017</a:t>
+              <a:t>30/08/2017</a:t>
             </a:fld>
             <a:endParaRPr lang="pt-BR"/>
           </a:p>
@@ -3313,6 +3314,13 @@
   <p:clrMapOvr>
     <a:masterClrMapping/>
   </p:clrMapOvr>
+  <p:timing>
+    <p:tnLst>
+      <p:par>
+        <p:cTn id="1" dur="indefinite" restart="never" nodeType="tmRoot"/>
+      </p:par>
+    </p:tnLst>
+  </p:timing>
 </p:sld>
 </file>
 
@@ -4644,6 +4652,13 @@
   <p:clrMapOvr>
     <a:masterClrMapping/>
   </p:clrMapOvr>
+  <p:timing>
+    <p:tnLst>
+      <p:par>
+        <p:cTn id="1" dur="indefinite" restart="never" nodeType="tmRoot"/>
+      </p:par>
+    </p:tnLst>
+  </p:timing>
 </p:sld>
 </file>
 
@@ -5374,6 +5389,1776 @@
   <p:clrMapOvr>
     <a:masterClrMapping/>
   </p:clrMapOvr>
+  <p:timing>
+    <p:tnLst>
+      <p:par>
+        <p:cTn id="1" dur="indefinite" restart="never" nodeType="tmRoot"/>
+      </p:par>
+    </p:tnLst>
+  </p:timing>
+</p:sld>
+</file>
+
+<file path=ppt/slides/slide4.xml><?xml version="1.0" encoding="utf-8"?>
+<p:sld xmlns:a="http://schemas.openxmlformats.org/drawingml/2006/main" xmlns:r="http://schemas.openxmlformats.org/officeDocument/2006/relationships" xmlns:p="http://schemas.openxmlformats.org/presentationml/2006/main">
+  <p:cSld>
+    <p:spTree>
+      <p:nvGrpSpPr>
+        <p:cNvPr id="1" name=""/>
+        <p:cNvGrpSpPr/>
+        <p:nvPr/>
+      </p:nvGrpSpPr>
+      <p:grpSpPr>
+        <a:xfrm>
+          <a:off x="0" y="0"/>
+          <a:ext cx="0" cy="0"/>
+          <a:chOff x="0" y="0"/>
+          <a:chExt cx="0" cy="0"/>
+        </a:xfrm>
+      </p:grpSpPr>
+      <p:sp>
+        <p:nvSpPr>
+          <p:cNvPr id="39" name="Retângulo 38"/>
+          <p:cNvSpPr/>
+          <p:nvPr/>
+        </p:nvSpPr>
+        <p:spPr>
+          <a:xfrm>
+            <a:off x="130324" y="116632"/>
+            <a:ext cx="6025852" cy="6624736"/>
+          </a:xfrm>
+          <a:prstGeom prst="rect">
+            <a:avLst/>
+          </a:prstGeom>
+        </p:spPr>
+        <p:style>
+          <a:lnRef idx="1">
+            <a:schemeClr val="accent3"/>
+          </a:lnRef>
+          <a:fillRef idx="2">
+            <a:schemeClr val="accent3"/>
+          </a:fillRef>
+          <a:effectRef idx="1">
+            <a:schemeClr val="accent3"/>
+          </a:effectRef>
+          <a:fontRef idx="minor">
+            <a:schemeClr val="dk1"/>
+          </a:fontRef>
+        </p:style>
+        <p:txBody>
+          <a:bodyPr rtlCol="0" anchor="ctr"/>
+          <a:lstStyle/>
+          <a:p>
+            <a:pPr algn="ctr"/>
+            <a:endParaRPr lang="pt-BR"/>
+          </a:p>
+        </p:txBody>
+      </p:sp>
+      <p:sp>
+        <p:nvSpPr>
+          <p:cNvPr id="6" name="Retângulo 5"/>
+          <p:cNvSpPr/>
+          <p:nvPr/>
+        </p:nvSpPr>
+        <p:spPr>
+          <a:xfrm>
+            <a:off x="251519" y="4955966"/>
+            <a:ext cx="5560991" cy="1728192"/>
+          </a:xfrm>
+          <a:prstGeom prst="rect">
+            <a:avLst/>
+          </a:prstGeom>
+        </p:spPr>
+        <p:style>
+          <a:lnRef idx="1">
+            <a:schemeClr val="accent1"/>
+          </a:lnRef>
+          <a:fillRef idx="2">
+            <a:schemeClr val="accent1"/>
+          </a:fillRef>
+          <a:effectRef idx="1">
+            <a:schemeClr val="accent1"/>
+          </a:effectRef>
+          <a:fontRef idx="minor">
+            <a:schemeClr val="dk1"/>
+          </a:fontRef>
+        </p:style>
+        <p:txBody>
+          <a:bodyPr rtlCol="0" anchor="ctr"/>
+          <a:lstStyle/>
+          <a:p>
+            <a:pPr algn="ctr"/>
+            <a:endParaRPr lang="pt-BR" dirty="0"/>
+          </a:p>
+        </p:txBody>
+      </p:sp>
+      <p:sp>
+        <p:nvSpPr>
+          <p:cNvPr id="4" name="Retângulo de cantos arredondados 3"/>
+          <p:cNvSpPr/>
+          <p:nvPr/>
+        </p:nvSpPr>
+        <p:spPr>
+          <a:xfrm>
+            <a:off x="395536" y="5269854"/>
+            <a:ext cx="2362928" cy="427398"/>
+          </a:xfrm>
+          <a:prstGeom prst="roundRect">
+            <a:avLst/>
+          </a:prstGeom>
+          <a:solidFill>
+            <a:schemeClr val="accent2">
+              <a:lumMod val="60000"/>
+              <a:lumOff val="40000"/>
+            </a:schemeClr>
+          </a:solidFill>
+          <a:ln>
+            <a:prstDash val="dash"/>
+          </a:ln>
+        </p:spPr>
+        <p:style>
+          <a:lnRef idx="2">
+            <a:schemeClr val="accent1">
+              <a:shade val="50000"/>
+            </a:schemeClr>
+          </a:lnRef>
+          <a:fillRef idx="1">
+            <a:schemeClr val="accent1"/>
+          </a:fillRef>
+          <a:effectRef idx="0">
+            <a:schemeClr val="accent1"/>
+          </a:effectRef>
+          <a:fontRef idx="minor">
+            <a:schemeClr val="lt1"/>
+          </a:fontRef>
+        </p:style>
+        <p:txBody>
+          <a:bodyPr rtlCol="0" anchor="ctr"/>
+          <a:lstStyle/>
+          <a:p>
+            <a:pPr algn="ctr"/>
+            <a:r>
+              <a:rPr lang="pt-BR" dirty="0" smtClean="0">
+                <a:solidFill>
+                  <a:schemeClr val="tx1"/>
+                </a:solidFill>
+              </a:rPr>
+              <a:t>Mapa</a:t>
+            </a:r>
+            <a:endParaRPr lang="pt-BR" dirty="0">
+              <a:solidFill>
+                <a:schemeClr val="tx1"/>
+              </a:solidFill>
+            </a:endParaRPr>
+          </a:p>
+        </p:txBody>
+      </p:sp>
+      <p:sp>
+        <p:nvSpPr>
+          <p:cNvPr id="5" name="Retângulo de cantos arredondados 4"/>
+          <p:cNvSpPr/>
+          <p:nvPr/>
+        </p:nvSpPr>
+        <p:spPr>
+          <a:xfrm>
+            <a:off x="3275856" y="5269854"/>
+            <a:ext cx="2115495" cy="427398"/>
+          </a:xfrm>
+          <a:prstGeom prst="roundRect">
+            <a:avLst/>
+          </a:prstGeom>
+          <a:solidFill>
+            <a:schemeClr val="accent4">
+              <a:lumMod val="60000"/>
+              <a:lumOff val="40000"/>
+            </a:schemeClr>
+          </a:solidFill>
+          <a:ln>
+            <a:prstDash val="dash"/>
+          </a:ln>
+        </p:spPr>
+        <p:style>
+          <a:lnRef idx="2">
+            <a:schemeClr val="accent1">
+              <a:shade val="50000"/>
+            </a:schemeClr>
+          </a:lnRef>
+          <a:fillRef idx="1">
+            <a:schemeClr val="accent1"/>
+          </a:fillRef>
+          <a:effectRef idx="0">
+            <a:schemeClr val="accent1"/>
+          </a:effectRef>
+          <a:fontRef idx="minor">
+            <a:schemeClr val="lt1"/>
+          </a:fontRef>
+        </p:style>
+        <p:txBody>
+          <a:bodyPr rtlCol="0" anchor="ctr"/>
+          <a:lstStyle/>
+          <a:p>
+            <a:pPr algn="ctr"/>
+            <a:r>
+              <a:rPr lang="pt-BR" dirty="0" smtClean="0">
+                <a:solidFill>
+                  <a:schemeClr val="tx1"/>
+                </a:solidFill>
+              </a:rPr>
+              <a:t>Dados Estatísticos</a:t>
+            </a:r>
+            <a:endParaRPr lang="pt-BR" dirty="0">
+              <a:solidFill>
+                <a:schemeClr val="tx1"/>
+              </a:solidFill>
+            </a:endParaRPr>
+          </a:p>
+        </p:txBody>
+      </p:sp>
+      <p:sp>
+        <p:nvSpPr>
+          <p:cNvPr id="3" name="CaixaDeTexto 2"/>
+          <p:cNvSpPr txBox="1"/>
+          <p:nvPr/>
+        </p:nvSpPr>
+        <p:spPr>
+          <a:xfrm>
+            <a:off x="251519" y="4955966"/>
+            <a:ext cx="915635" cy="369332"/>
+          </a:xfrm>
+          <a:prstGeom prst="rect">
+            <a:avLst/>
+          </a:prstGeom>
+          <a:noFill/>
+        </p:spPr>
+        <p:txBody>
+          <a:bodyPr wrap="none" rtlCol="0">
+            <a:spAutoFit/>
+          </a:bodyPr>
+          <a:lstStyle/>
+          <a:p>
+            <a:r>
+              <a:rPr lang="pt-BR" dirty="0" smtClean="0"/>
+              <a:t>Modelo</a:t>
+            </a:r>
+            <a:endParaRPr lang="pt-BR" dirty="0"/>
+          </a:p>
+        </p:txBody>
+      </p:sp>
+      <p:sp>
+        <p:nvSpPr>
+          <p:cNvPr id="14" name="Retângulo de cantos arredondados 13"/>
+          <p:cNvSpPr/>
+          <p:nvPr/>
+        </p:nvSpPr>
+        <p:spPr>
+          <a:xfrm>
+            <a:off x="395535" y="5905475"/>
+            <a:ext cx="4995815" cy="619869"/>
+          </a:xfrm>
+          <a:prstGeom prst="roundRect">
+            <a:avLst/>
+          </a:prstGeom>
+          <a:solidFill>
+            <a:schemeClr val="tx2">
+              <a:lumMod val="40000"/>
+              <a:lumOff val="60000"/>
+            </a:schemeClr>
+          </a:solidFill>
+          <a:ln>
+            <a:prstDash val="dash"/>
+          </a:ln>
+        </p:spPr>
+        <p:style>
+          <a:lnRef idx="2">
+            <a:schemeClr val="accent1">
+              <a:shade val="50000"/>
+            </a:schemeClr>
+          </a:lnRef>
+          <a:fillRef idx="1">
+            <a:schemeClr val="accent1"/>
+          </a:fillRef>
+          <a:effectRef idx="0">
+            <a:schemeClr val="accent1"/>
+          </a:effectRef>
+          <a:fontRef idx="minor">
+            <a:schemeClr val="lt1"/>
+          </a:fontRef>
+        </p:style>
+        <p:txBody>
+          <a:bodyPr rtlCol="0" anchor="ctr"/>
+          <a:lstStyle/>
+          <a:p>
+            <a:pPr algn="ctr"/>
+            <a:r>
+              <a:rPr lang="pt-BR" dirty="0" smtClean="0">
+                <a:solidFill>
+                  <a:schemeClr val="tx1"/>
+                </a:solidFill>
+              </a:rPr>
+              <a:t>Consulta de Dados</a:t>
+            </a:r>
+            <a:endParaRPr lang="pt-BR" dirty="0">
+              <a:solidFill>
+                <a:schemeClr val="tx1"/>
+              </a:solidFill>
+            </a:endParaRPr>
+          </a:p>
+        </p:txBody>
+      </p:sp>
+      <p:sp>
+        <p:nvSpPr>
+          <p:cNvPr id="23" name="Retângulo de cantos arredondados 22"/>
+          <p:cNvSpPr/>
+          <p:nvPr/>
+        </p:nvSpPr>
+        <p:spPr>
+          <a:xfrm>
+            <a:off x="6829242" y="4711374"/>
+            <a:ext cx="2088232" cy="2088232"/>
+          </a:xfrm>
+          <a:prstGeom prst="roundRect">
+            <a:avLst/>
+          </a:prstGeom>
+        </p:spPr>
+        <p:style>
+          <a:lnRef idx="1">
+            <a:schemeClr val="accent4"/>
+          </a:lnRef>
+          <a:fillRef idx="2">
+            <a:schemeClr val="accent4"/>
+          </a:fillRef>
+          <a:effectRef idx="1">
+            <a:schemeClr val="accent4"/>
+          </a:effectRef>
+          <a:fontRef idx="minor">
+            <a:schemeClr val="dk1"/>
+          </a:fontRef>
+        </p:style>
+        <p:txBody>
+          <a:bodyPr rtlCol="0" anchor="ctr"/>
+          <a:lstStyle/>
+          <a:p>
+            <a:pPr algn="ctr"/>
+            <a:endParaRPr lang="pt-BR"/>
+          </a:p>
+        </p:txBody>
+      </p:sp>
+      <p:sp>
+        <p:nvSpPr>
+          <p:cNvPr id="24" name="CaixaDeTexto 23"/>
+          <p:cNvSpPr txBox="1"/>
+          <p:nvPr/>
+        </p:nvSpPr>
+        <p:spPr>
+          <a:xfrm>
+            <a:off x="7363840" y="4771300"/>
+            <a:ext cx="969048" cy="369332"/>
+          </a:xfrm>
+          <a:prstGeom prst="rect">
+            <a:avLst/>
+          </a:prstGeom>
+          <a:noFill/>
+        </p:spPr>
+        <p:txBody>
+          <a:bodyPr wrap="none" rtlCol="0">
+            <a:spAutoFit/>
+          </a:bodyPr>
+          <a:lstStyle/>
+          <a:p>
+            <a:r>
+              <a:rPr lang="pt-BR" dirty="0" smtClean="0"/>
+              <a:t>Servidor</a:t>
+            </a:r>
+            <a:endParaRPr lang="pt-BR" dirty="0"/>
+          </a:p>
+        </p:txBody>
+      </p:sp>
+      <p:sp>
+        <p:nvSpPr>
+          <p:cNvPr id="25" name="Fluxograma: Disco magnético 24"/>
+          <p:cNvSpPr/>
+          <p:nvPr/>
+        </p:nvSpPr>
+        <p:spPr>
+          <a:xfrm>
+            <a:off x="7057748" y="5140632"/>
+            <a:ext cx="1552210" cy="1384712"/>
+          </a:xfrm>
+          <a:prstGeom prst="flowChartMagneticDisk">
+            <a:avLst/>
+          </a:prstGeom>
+        </p:spPr>
+        <p:style>
+          <a:lnRef idx="1">
+            <a:schemeClr val="accent2"/>
+          </a:lnRef>
+          <a:fillRef idx="2">
+            <a:schemeClr val="accent2"/>
+          </a:fillRef>
+          <a:effectRef idx="1">
+            <a:schemeClr val="accent2"/>
+          </a:effectRef>
+          <a:fontRef idx="minor">
+            <a:schemeClr val="dk1"/>
+          </a:fontRef>
+        </p:style>
+        <p:txBody>
+          <a:bodyPr rtlCol="0" anchor="ctr"/>
+          <a:lstStyle/>
+          <a:p>
+            <a:pPr algn="ctr"/>
+            <a:r>
+              <a:rPr lang="pt-BR" sz="1200" dirty="0" smtClean="0"/>
+              <a:t>Informações Geográficas e Dados Estatísticos</a:t>
+            </a:r>
+            <a:endParaRPr lang="pt-BR" sz="1200" dirty="0"/>
+          </a:p>
+        </p:txBody>
+      </p:sp>
+      <p:sp>
+        <p:nvSpPr>
+          <p:cNvPr id="26" name="CaixaDeTexto 25"/>
+          <p:cNvSpPr txBox="1"/>
+          <p:nvPr/>
+        </p:nvSpPr>
+        <p:spPr>
+          <a:xfrm>
+            <a:off x="7057748" y="5195969"/>
+            <a:ext cx="1519840" cy="338554"/>
+          </a:xfrm>
+          <a:prstGeom prst="rect">
+            <a:avLst/>
+          </a:prstGeom>
+          <a:noFill/>
+        </p:spPr>
+        <p:txBody>
+          <a:bodyPr wrap="none" rtlCol="0">
+            <a:spAutoFit/>
+          </a:bodyPr>
+          <a:lstStyle/>
+          <a:p>
+            <a:r>
+              <a:rPr lang="pt-BR" sz="1600" dirty="0" smtClean="0"/>
+              <a:t>Banco de Dados</a:t>
+            </a:r>
+            <a:endParaRPr lang="pt-BR" sz="1600" dirty="0"/>
+          </a:p>
+        </p:txBody>
+      </p:sp>
+      <p:cxnSp>
+        <p:nvCxnSpPr>
+          <p:cNvPr id="29" name="Conector de seta reta 28"/>
+          <p:cNvCxnSpPr/>
+          <p:nvPr/>
+        </p:nvCxnSpPr>
+        <p:spPr>
+          <a:xfrm>
+            <a:off x="5831102" y="6555549"/>
+            <a:ext cx="991737" cy="0"/>
+          </a:xfrm>
+          <a:prstGeom prst="straightConnector1">
+            <a:avLst/>
+          </a:prstGeom>
+          <a:ln>
+            <a:tailEnd type="arrow"/>
+          </a:ln>
+        </p:spPr>
+        <p:style>
+          <a:lnRef idx="1">
+            <a:schemeClr val="accent1"/>
+          </a:lnRef>
+          <a:fillRef idx="0">
+            <a:schemeClr val="accent1"/>
+          </a:fillRef>
+          <a:effectRef idx="0">
+            <a:schemeClr val="accent1"/>
+          </a:effectRef>
+          <a:fontRef idx="minor">
+            <a:schemeClr val="tx1"/>
+          </a:fontRef>
+        </p:style>
+      </p:cxnSp>
+      <p:sp>
+        <p:nvSpPr>
+          <p:cNvPr id="30" name="CaixaDeTexto 29"/>
+          <p:cNvSpPr txBox="1"/>
+          <p:nvPr/>
+        </p:nvSpPr>
+        <p:spPr>
+          <a:xfrm>
+            <a:off x="5831102" y="6194117"/>
+            <a:ext cx="1040862" cy="307777"/>
+          </a:xfrm>
+          <a:prstGeom prst="rect">
+            <a:avLst/>
+          </a:prstGeom>
+          <a:noFill/>
+        </p:spPr>
+        <p:txBody>
+          <a:bodyPr wrap="none" rtlCol="0">
+            <a:spAutoFit/>
+          </a:bodyPr>
+          <a:lstStyle/>
+          <a:p>
+            <a:r>
+              <a:rPr lang="pt-BR" sz="1400" dirty="0" smtClean="0"/>
+              <a:t>Requisições</a:t>
+            </a:r>
+            <a:endParaRPr lang="pt-BR" sz="1400" dirty="0"/>
+          </a:p>
+        </p:txBody>
+      </p:sp>
+      <p:cxnSp>
+        <p:nvCxnSpPr>
+          <p:cNvPr id="36" name="Conector de seta reta 35"/>
+          <p:cNvCxnSpPr/>
+          <p:nvPr/>
+        </p:nvCxnSpPr>
+        <p:spPr>
+          <a:xfrm flipH="1">
+            <a:off x="5812511" y="6001728"/>
+            <a:ext cx="991737" cy="0"/>
+          </a:xfrm>
+          <a:prstGeom prst="straightConnector1">
+            <a:avLst/>
+          </a:prstGeom>
+          <a:ln>
+            <a:tailEnd type="arrow"/>
+          </a:ln>
+        </p:spPr>
+        <p:style>
+          <a:lnRef idx="1">
+            <a:schemeClr val="accent1"/>
+          </a:lnRef>
+          <a:fillRef idx="0">
+            <a:schemeClr val="accent1"/>
+          </a:fillRef>
+          <a:effectRef idx="0">
+            <a:schemeClr val="accent1"/>
+          </a:effectRef>
+          <a:fontRef idx="minor">
+            <a:schemeClr val="tx1"/>
+          </a:fontRef>
+        </p:style>
+      </p:cxnSp>
+      <p:sp>
+        <p:nvSpPr>
+          <p:cNvPr id="37" name="CaixaDeTexto 36"/>
+          <p:cNvSpPr txBox="1"/>
+          <p:nvPr/>
+        </p:nvSpPr>
+        <p:spPr>
+          <a:xfrm>
+            <a:off x="6030772" y="5666173"/>
+            <a:ext cx="641522" cy="307777"/>
+          </a:xfrm>
+          <a:prstGeom prst="rect">
+            <a:avLst/>
+          </a:prstGeom>
+          <a:noFill/>
+        </p:spPr>
+        <p:txBody>
+          <a:bodyPr wrap="none" rtlCol="0">
+            <a:spAutoFit/>
+          </a:bodyPr>
+          <a:lstStyle/>
+          <a:p>
+            <a:r>
+              <a:rPr lang="pt-BR" sz="1400" dirty="0" smtClean="0"/>
+              <a:t>Dados</a:t>
+            </a:r>
+            <a:endParaRPr lang="pt-BR" sz="1400" dirty="0"/>
+          </a:p>
+        </p:txBody>
+      </p:sp>
+      <p:cxnSp>
+        <p:nvCxnSpPr>
+          <p:cNvPr id="47" name="Conector de seta reta 46"/>
+          <p:cNvCxnSpPr/>
+          <p:nvPr/>
+        </p:nvCxnSpPr>
+        <p:spPr>
+          <a:xfrm flipV="1">
+            <a:off x="1763688" y="4955966"/>
+            <a:ext cx="0" cy="329564"/>
+          </a:xfrm>
+          <a:prstGeom prst="straightConnector1">
+            <a:avLst/>
+          </a:prstGeom>
+          <a:ln>
+            <a:tailEnd type="arrow"/>
+          </a:ln>
+        </p:spPr>
+        <p:style>
+          <a:lnRef idx="1">
+            <a:schemeClr val="accent1"/>
+          </a:lnRef>
+          <a:fillRef idx="0">
+            <a:schemeClr val="accent1"/>
+          </a:fillRef>
+          <a:effectRef idx="0">
+            <a:schemeClr val="accent1"/>
+          </a:effectRef>
+          <a:fontRef idx="minor">
+            <a:schemeClr val="tx1"/>
+          </a:fontRef>
+        </p:style>
+      </p:cxnSp>
+      <p:cxnSp>
+        <p:nvCxnSpPr>
+          <p:cNvPr id="49" name="Conector de seta reta 48"/>
+          <p:cNvCxnSpPr>
+            <a:stCxn id="5" idx="0"/>
+          </p:cNvCxnSpPr>
+          <p:nvPr/>
+        </p:nvCxnSpPr>
+        <p:spPr>
+          <a:xfrm flipV="1">
+            <a:off x="4333604" y="4955966"/>
+            <a:ext cx="0" cy="313888"/>
+          </a:xfrm>
+          <a:prstGeom prst="straightConnector1">
+            <a:avLst/>
+          </a:prstGeom>
+          <a:ln>
+            <a:tailEnd type="arrow"/>
+          </a:ln>
+        </p:spPr>
+        <p:style>
+          <a:lnRef idx="1">
+            <a:schemeClr val="accent1"/>
+          </a:lnRef>
+          <a:fillRef idx="0">
+            <a:schemeClr val="accent1"/>
+          </a:fillRef>
+          <a:effectRef idx="0">
+            <a:schemeClr val="accent1"/>
+          </a:effectRef>
+          <a:fontRef idx="minor">
+            <a:schemeClr val="tx1"/>
+          </a:fontRef>
+        </p:style>
+      </p:cxnSp>
+      <p:cxnSp>
+        <p:nvCxnSpPr>
+          <p:cNvPr id="51" name="Conector de seta reta 50"/>
+          <p:cNvCxnSpPr>
+            <a:stCxn id="6" idx="0"/>
+          </p:cNvCxnSpPr>
+          <p:nvPr/>
+        </p:nvCxnSpPr>
+        <p:spPr>
+          <a:xfrm>
+            <a:off x="3032015" y="4955966"/>
+            <a:ext cx="0" cy="949509"/>
+          </a:xfrm>
+          <a:prstGeom prst="straightConnector1">
+            <a:avLst/>
+          </a:prstGeom>
+          <a:ln>
+            <a:tailEnd type="arrow"/>
+          </a:ln>
+        </p:spPr>
+        <p:style>
+          <a:lnRef idx="1">
+            <a:schemeClr val="accent1"/>
+          </a:lnRef>
+          <a:fillRef idx="0">
+            <a:schemeClr val="accent1"/>
+          </a:fillRef>
+          <a:effectRef idx="0">
+            <a:schemeClr val="accent1"/>
+          </a:effectRef>
+          <a:fontRef idx="minor">
+            <a:schemeClr val="tx1"/>
+          </a:fontRef>
+        </p:style>
+      </p:cxnSp>
+      <p:sp>
+        <p:nvSpPr>
+          <p:cNvPr id="58" name="Retângulo 57"/>
+          <p:cNvSpPr/>
+          <p:nvPr/>
+        </p:nvSpPr>
+        <p:spPr>
+          <a:xfrm>
+            <a:off x="251519" y="2780928"/>
+            <a:ext cx="5560992" cy="1872208"/>
+          </a:xfrm>
+          <a:prstGeom prst="rect">
+            <a:avLst/>
+          </a:prstGeom>
+        </p:spPr>
+        <p:style>
+          <a:lnRef idx="1">
+            <a:schemeClr val="accent4"/>
+          </a:lnRef>
+          <a:fillRef idx="2">
+            <a:schemeClr val="accent4"/>
+          </a:fillRef>
+          <a:effectRef idx="1">
+            <a:schemeClr val="accent4"/>
+          </a:effectRef>
+          <a:fontRef idx="minor">
+            <a:schemeClr val="dk1"/>
+          </a:fontRef>
+        </p:style>
+        <p:txBody>
+          <a:bodyPr rtlCol="0" anchor="ctr"/>
+          <a:lstStyle/>
+          <a:p>
+            <a:pPr algn="ctr"/>
+            <a:endParaRPr lang="pt-BR"/>
+          </a:p>
+        </p:txBody>
+      </p:sp>
+      <p:sp>
+        <p:nvSpPr>
+          <p:cNvPr id="59" name="CaixaDeTexto 58"/>
+          <p:cNvSpPr txBox="1"/>
+          <p:nvPr/>
+        </p:nvSpPr>
+        <p:spPr>
+          <a:xfrm>
+            <a:off x="246892" y="2780928"/>
+            <a:ext cx="1312154" cy="369332"/>
+          </a:xfrm>
+          <a:prstGeom prst="rect">
+            <a:avLst/>
+          </a:prstGeom>
+          <a:noFill/>
+        </p:spPr>
+        <p:txBody>
+          <a:bodyPr wrap="none" rtlCol="0">
+            <a:spAutoFit/>
+          </a:bodyPr>
+          <a:lstStyle/>
+          <a:p>
+            <a:r>
+              <a:rPr lang="pt-BR" dirty="0" smtClean="0"/>
+              <a:t>Controlador</a:t>
+            </a:r>
+            <a:endParaRPr lang="pt-BR" dirty="0"/>
+          </a:p>
+        </p:txBody>
+      </p:sp>
+      <p:sp>
+        <p:nvSpPr>
+          <p:cNvPr id="60" name="Retângulo de cantos arredondados 59"/>
+          <p:cNvSpPr/>
+          <p:nvPr/>
+        </p:nvSpPr>
+        <p:spPr>
+          <a:xfrm>
+            <a:off x="1731382" y="3074239"/>
+            <a:ext cx="1688490" cy="418047"/>
+          </a:xfrm>
+          <a:prstGeom prst="roundRect">
+            <a:avLst/>
+          </a:prstGeom>
+          <a:solidFill>
+            <a:schemeClr val="accent6">
+              <a:lumMod val="60000"/>
+              <a:lumOff val="40000"/>
+            </a:schemeClr>
+          </a:solidFill>
+          <a:ln>
+            <a:prstDash val="dash"/>
+          </a:ln>
+        </p:spPr>
+        <p:style>
+          <a:lnRef idx="2">
+            <a:schemeClr val="accent1">
+              <a:shade val="50000"/>
+            </a:schemeClr>
+          </a:lnRef>
+          <a:fillRef idx="1">
+            <a:schemeClr val="accent1"/>
+          </a:fillRef>
+          <a:effectRef idx="0">
+            <a:schemeClr val="accent1"/>
+          </a:effectRef>
+          <a:fontRef idx="minor">
+            <a:schemeClr val="lt1"/>
+          </a:fontRef>
+        </p:style>
+        <p:txBody>
+          <a:bodyPr rtlCol="0" anchor="ctr"/>
+          <a:lstStyle/>
+          <a:p>
+            <a:pPr algn="ctr"/>
+            <a:r>
+              <a:rPr lang="pt-BR" dirty="0" smtClean="0">
+                <a:solidFill>
+                  <a:schemeClr val="tx1"/>
+                </a:solidFill>
+              </a:rPr>
+              <a:t>Mapeamento</a:t>
+            </a:r>
+            <a:endParaRPr lang="pt-BR" dirty="0">
+              <a:solidFill>
+                <a:schemeClr val="tx1"/>
+              </a:solidFill>
+            </a:endParaRPr>
+          </a:p>
+        </p:txBody>
+      </p:sp>
+      <p:sp>
+        <p:nvSpPr>
+          <p:cNvPr id="61" name="Retângulo de cantos arredondados 60"/>
+          <p:cNvSpPr/>
+          <p:nvPr/>
+        </p:nvSpPr>
+        <p:spPr>
+          <a:xfrm>
+            <a:off x="395536" y="3717033"/>
+            <a:ext cx="5206393" cy="630058"/>
+          </a:xfrm>
+          <a:prstGeom prst="roundRect">
+            <a:avLst/>
+          </a:prstGeom>
+          <a:solidFill>
+            <a:schemeClr val="bg2">
+              <a:lumMod val="75000"/>
+            </a:schemeClr>
+          </a:solidFill>
+          <a:ln>
+            <a:prstDash val="dash"/>
+          </a:ln>
+        </p:spPr>
+        <p:style>
+          <a:lnRef idx="2">
+            <a:schemeClr val="accent1">
+              <a:shade val="50000"/>
+            </a:schemeClr>
+          </a:lnRef>
+          <a:fillRef idx="1">
+            <a:schemeClr val="accent1"/>
+          </a:fillRef>
+          <a:effectRef idx="0">
+            <a:schemeClr val="accent1"/>
+          </a:effectRef>
+          <a:fontRef idx="minor">
+            <a:schemeClr val="lt1"/>
+          </a:fontRef>
+        </p:style>
+        <p:txBody>
+          <a:bodyPr rtlCol="0" anchor="ctr"/>
+          <a:lstStyle/>
+          <a:p>
+            <a:pPr algn="ctr"/>
+            <a:r>
+              <a:rPr lang="pt-BR" dirty="0" smtClean="0">
+                <a:solidFill>
+                  <a:schemeClr val="tx1"/>
+                </a:solidFill>
+              </a:rPr>
+              <a:t>Extração de Dados</a:t>
+            </a:r>
+            <a:endParaRPr lang="pt-BR" dirty="0">
+              <a:solidFill>
+                <a:schemeClr val="tx1"/>
+              </a:solidFill>
+            </a:endParaRPr>
+          </a:p>
+        </p:txBody>
+      </p:sp>
+      <p:sp>
+        <p:nvSpPr>
+          <p:cNvPr id="62" name="Retângulo de cantos arredondados 61"/>
+          <p:cNvSpPr/>
+          <p:nvPr/>
+        </p:nvSpPr>
+        <p:spPr>
+          <a:xfrm>
+            <a:off x="3879273" y="3074240"/>
+            <a:ext cx="1700839" cy="418046"/>
+          </a:xfrm>
+          <a:prstGeom prst="roundRect">
+            <a:avLst/>
+          </a:prstGeom>
+          <a:solidFill>
+            <a:schemeClr val="accent5">
+              <a:lumMod val="40000"/>
+              <a:lumOff val="60000"/>
+            </a:schemeClr>
+          </a:solidFill>
+          <a:ln>
+            <a:prstDash val="dash"/>
+          </a:ln>
+        </p:spPr>
+        <p:style>
+          <a:lnRef idx="2">
+            <a:schemeClr val="accent1">
+              <a:shade val="50000"/>
+            </a:schemeClr>
+          </a:lnRef>
+          <a:fillRef idx="1">
+            <a:schemeClr val="accent1"/>
+          </a:fillRef>
+          <a:effectRef idx="0">
+            <a:schemeClr val="accent1"/>
+          </a:effectRef>
+          <a:fontRef idx="minor">
+            <a:schemeClr val="lt1"/>
+          </a:fontRef>
+        </p:style>
+        <p:txBody>
+          <a:bodyPr rtlCol="0" anchor="ctr"/>
+          <a:lstStyle/>
+          <a:p>
+            <a:pPr algn="ctr"/>
+            <a:r>
+              <a:rPr lang="pt-BR" dirty="0" smtClean="0">
+                <a:solidFill>
+                  <a:schemeClr val="tx1"/>
+                </a:solidFill>
+              </a:rPr>
+              <a:t>Filtragem</a:t>
+            </a:r>
+            <a:endParaRPr lang="pt-BR" dirty="0">
+              <a:solidFill>
+                <a:schemeClr val="tx1"/>
+              </a:solidFill>
+            </a:endParaRPr>
+          </a:p>
+        </p:txBody>
+      </p:sp>
+      <p:cxnSp>
+        <p:nvCxnSpPr>
+          <p:cNvPr id="64" name="Conector de seta reta 63"/>
+          <p:cNvCxnSpPr>
+            <a:stCxn id="6" idx="0"/>
+            <a:endCxn id="58" idx="2"/>
+          </p:cNvCxnSpPr>
+          <p:nvPr/>
+        </p:nvCxnSpPr>
+        <p:spPr>
+          <a:xfrm flipV="1">
+            <a:off x="3032015" y="4653136"/>
+            <a:ext cx="0" cy="302830"/>
+          </a:xfrm>
+          <a:prstGeom prst="straightConnector1">
+            <a:avLst/>
+          </a:prstGeom>
+          <a:ln>
+            <a:headEnd type="arrow"/>
+            <a:tailEnd type="arrow"/>
+          </a:ln>
+        </p:spPr>
+        <p:style>
+          <a:lnRef idx="2">
+            <a:schemeClr val="accent2"/>
+          </a:lnRef>
+          <a:fillRef idx="0">
+            <a:schemeClr val="accent2"/>
+          </a:fillRef>
+          <a:effectRef idx="1">
+            <a:schemeClr val="accent2"/>
+          </a:effectRef>
+          <a:fontRef idx="minor">
+            <a:schemeClr val="tx1"/>
+          </a:fontRef>
+        </p:style>
+      </p:cxnSp>
+      <p:sp>
+        <p:nvSpPr>
+          <p:cNvPr id="83" name="Retângulo 82"/>
+          <p:cNvSpPr/>
+          <p:nvPr/>
+        </p:nvSpPr>
+        <p:spPr>
+          <a:xfrm>
+            <a:off x="251519" y="1206044"/>
+            <a:ext cx="5560992" cy="1286852"/>
+          </a:xfrm>
+          <a:prstGeom prst="rect">
+            <a:avLst/>
+          </a:prstGeom>
+        </p:spPr>
+        <p:style>
+          <a:lnRef idx="1">
+            <a:schemeClr val="accent6"/>
+          </a:lnRef>
+          <a:fillRef idx="2">
+            <a:schemeClr val="accent6"/>
+          </a:fillRef>
+          <a:effectRef idx="1">
+            <a:schemeClr val="accent6"/>
+          </a:effectRef>
+          <a:fontRef idx="minor">
+            <a:schemeClr val="dk1"/>
+          </a:fontRef>
+        </p:style>
+        <p:txBody>
+          <a:bodyPr rtlCol="0" anchor="ctr"/>
+          <a:lstStyle/>
+          <a:p>
+            <a:pPr algn="ctr"/>
+            <a:endParaRPr lang="pt-BR"/>
+          </a:p>
+        </p:txBody>
+      </p:sp>
+      <p:sp>
+        <p:nvSpPr>
+          <p:cNvPr id="84" name="CaixaDeTexto 83"/>
+          <p:cNvSpPr txBox="1"/>
+          <p:nvPr/>
+        </p:nvSpPr>
+        <p:spPr>
+          <a:xfrm>
+            <a:off x="251519" y="1197445"/>
+            <a:ext cx="691215" cy="369332"/>
+          </a:xfrm>
+          <a:prstGeom prst="rect">
+            <a:avLst/>
+          </a:prstGeom>
+          <a:noFill/>
+        </p:spPr>
+        <p:txBody>
+          <a:bodyPr wrap="none" rtlCol="0">
+            <a:spAutoFit/>
+          </a:bodyPr>
+          <a:lstStyle/>
+          <a:p>
+            <a:r>
+              <a:rPr lang="pt-BR" dirty="0" smtClean="0"/>
+              <a:t>Visão</a:t>
+            </a:r>
+            <a:endParaRPr lang="pt-BR" dirty="0"/>
+          </a:p>
+        </p:txBody>
+      </p:sp>
+      <p:cxnSp>
+        <p:nvCxnSpPr>
+          <p:cNvPr id="86" name="Conector de seta reta 85"/>
+          <p:cNvCxnSpPr>
+            <a:stCxn id="58" idx="0"/>
+          </p:cNvCxnSpPr>
+          <p:nvPr/>
+        </p:nvCxnSpPr>
+        <p:spPr>
+          <a:xfrm flipH="1" flipV="1">
+            <a:off x="3032014" y="2492896"/>
+            <a:ext cx="1" cy="288032"/>
+          </a:xfrm>
+          <a:prstGeom prst="straightConnector1">
+            <a:avLst/>
+          </a:prstGeom>
+          <a:ln>
+            <a:headEnd type="arrow"/>
+            <a:tailEnd type="arrow"/>
+          </a:ln>
+        </p:spPr>
+        <p:style>
+          <a:lnRef idx="2">
+            <a:schemeClr val="accent2"/>
+          </a:lnRef>
+          <a:fillRef idx="0">
+            <a:schemeClr val="accent2"/>
+          </a:fillRef>
+          <a:effectRef idx="1">
+            <a:schemeClr val="accent2"/>
+          </a:effectRef>
+          <a:fontRef idx="minor">
+            <a:schemeClr val="tx1"/>
+          </a:fontRef>
+        </p:style>
+      </p:cxnSp>
+      <p:sp>
+        <p:nvSpPr>
+          <p:cNvPr id="87" name="Retângulo de cantos arredondados 86"/>
+          <p:cNvSpPr/>
+          <p:nvPr/>
+        </p:nvSpPr>
+        <p:spPr>
+          <a:xfrm>
+            <a:off x="807840" y="1545884"/>
+            <a:ext cx="2085602" cy="658982"/>
+          </a:xfrm>
+          <a:prstGeom prst="roundRect">
+            <a:avLst/>
+          </a:prstGeom>
+          <a:solidFill>
+            <a:schemeClr val="accent5">
+              <a:lumMod val="40000"/>
+              <a:lumOff val="60000"/>
+            </a:schemeClr>
+          </a:solidFill>
+          <a:ln>
+            <a:prstDash val="dash"/>
+          </a:ln>
+        </p:spPr>
+        <p:style>
+          <a:lnRef idx="2">
+            <a:schemeClr val="accent1">
+              <a:shade val="50000"/>
+            </a:schemeClr>
+          </a:lnRef>
+          <a:fillRef idx="1">
+            <a:schemeClr val="accent1"/>
+          </a:fillRef>
+          <a:effectRef idx="0">
+            <a:schemeClr val="accent1"/>
+          </a:effectRef>
+          <a:fontRef idx="minor">
+            <a:schemeClr val="lt1"/>
+          </a:fontRef>
+        </p:style>
+        <p:txBody>
+          <a:bodyPr rtlCol="0" anchor="ctr"/>
+          <a:lstStyle/>
+          <a:p>
+            <a:pPr algn="ctr"/>
+            <a:r>
+              <a:rPr lang="pt-BR" dirty="0" err="1" smtClean="0">
+                <a:solidFill>
+                  <a:schemeClr val="tx1"/>
+                </a:solidFill>
+              </a:rPr>
+              <a:t>Renderização</a:t>
+            </a:r>
+            <a:endParaRPr lang="pt-BR" dirty="0">
+              <a:solidFill>
+                <a:schemeClr val="tx1"/>
+              </a:solidFill>
+            </a:endParaRPr>
+          </a:p>
+        </p:txBody>
+      </p:sp>
+      <p:sp>
+        <p:nvSpPr>
+          <p:cNvPr id="88" name="Retângulo de cantos arredondados 87"/>
+          <p:cNvSpPr/>
+          <p:nvPr/>
+        </p:nvSpPr>
+        <p:spPr>
+          <a:xfrm>
+            <a:off x="3129485" y="1533243"/>
+            <a:ext cx="2450627" cy="671622"/>
+          </a:xfrm>
+          <a:prstGeom prst="roundRect">
+            <a:avLst/>
+          </a:prstGeom>
+          <a:solidFill>
+            <a:schemeClr val="accent5">
+              <a:lumMod val="40000"/>
+              <a:lumOff val="60000"/>
+            </a:schemeClr>
+          </a:solidFill>
+          <a:ln>
+            <a:prstDash val="dash"/>
+          </a:ln>
+        </p:spPr>
+        <p:style>
+          <a:lnRef idx="2">
+            <a:schemeClr val="accent1">
+              <a:shade val="50000"/>
+            </a:schemeClr>
+          </a:lnRef>
+          <a:fillRef idx="1">
+            <a:schemeClr val="accent1"/>
+          </a:fillRef>
+          <a:effectRef idx="0">
+            <a:schemeClr val="accent1"/>
+          </a:effectRef>
+          <a:fontRef idx="minor">
+            <a:schemeClr val="lt1"/>
+          </a:fontRef>
+        </p:style>
+        <p:txBody>
+          <a:bodyPr rtlCol="0" anchor="ctr"/>
+          <a:lstStyle/>
+          <a:p>
+            <a:pPr algn="ctr"/>
+            <a:r>
+              <a:rPr lang="pt-BR" dirty="0" smtClean="0">
+                <a:solidFill>
+                  <a:schemeClr val="tx1"/>
+                </a:solidFill>
+              </a:rPr>
+              <a:t>Controle de Interface com o Usuário</a:t>
+            </a:r>
+            <a:endParaRPr lang="pt-BR" dirty="0">
+              <a:solidFill>
+                <a:schemeClr val="tx1"/>
+              </a:solidFill>
+            </a:endParaRPr>
+          </a:p>
+        </p:txBody>
+      </p:sp>
+      <p:sp>
+        <p:nvSpPr>
+          <p:cNvPr id="93" name="Retângulo 92"/>
+          <p:cNvSpPr/>
+          <p:nvPr/>
+        </p:nvSpPr>
+        <p:spPr>
+          <a:xfrm>
+            <a:off x="246892" y="388985"/>
+            <a:ext cx="5565619" cy="432048"/>
+          </a:xfrm>
+          <a:prstGeom prst="rect">
+            <a:avLst/>
+          </a:prstGeom>
+        </p:spPr>
+        <p:style>
+          <a:lnRef idx="1">
+            <a:schemeClr val="accent2"/>
+          </a:lnRef>
+          <a:fillRef idx="2">
+            <a:schemeClr val="accent2"/>
+          </a:fillRef>
+          <a:effectRef idx="1">
+            <a:schemeClr val="accent2"/>
+          </a:effectRef>
+          <a:fontRef idx="minor">
+            <a:schemeClr val="dk1"/>
+          </a:fontRef>
+        </p:style>
+        <p:txBody>
+          <a:bodyPr rtlCol="0" anchor="ctr"/>
+          <a:lstStyle/>
+          <a:p>
+            <a:pPr algn="ctr"/>
+            <a:r>
+              <a:rPr lang="pt-BR" dirty="0" smtClean="0"/>
+              <a:t>Interface com o usuário</a:t>
+            </a:r>
+            <a:endParaRPr lang="pt-BR" dirty="0"/>
+          </a:p>
+        </p:txBody>
+      </p:sp>
+      <p:cxnSp>
+        <p:nvCxnSpPr>
+          <p:cNvPr id="95" name="Conector de seta reta 94"/>
+          <p:cNvCxnSpPr>
+            <a:endCxn id="83" idx="0"/>
+          </p:cNvCxnSpPr>
+          <p:nvPr/>
+        </p:nvCxnSpPr>
+        <p:spPr>
+          <a:xfrm>
+            <a:off x="3032015" y="821033"/>
+            <a:ext cx="0" cy="385011"/>
+          </a:xfrm>
+          <a:prstGeom prst="straightConnector1">
+            <a:avLst/>
+          </a:prstGeom>
+          <a:ln>
+            <a:headEnd type="arrow"/>
+            <a:tailEnd type="arrow"/>
+          </a:ln>
+        </p:spPr>
+        <p:style>
+          <a:lnRef idx="2">
+            <a:schemeClr val="accent2"/>
+          </a:lnRef>
+          <a:fillRef idx="0">
+            <a:schemeClr val="accent2"/>
+          </a:fillRef>
+          <a:effectRef idx="1">
+            <a:schemeClr val="accent2"/>
+          </a:effectRef>
+          <a:fontRef idx="minor">
+            <a:schemeClr val="tx1"/>
+          </a:fontRef>
+        </p:style>
+      </p:cxnSp>
+      <p:cxnSp>
+        <p:nvCxnSpPr>
+          <p:cNvPr id="117" name="Conector de seta reta 116"/>
+          <p:cNvCxnSpPr>
+            <a:stCxn id="14" idx="3"/>
+          </p:cNvCxnSpPr>
+          <p:nvPr/>
+        </p:nvCxnSpPr>
+        <p:spPr>
+          <a:xfrm flipV="1">
+            <a:off x="5391350" y="6215409"/>
+            <a:ext cx="421161" cy="1"/>
+          </a:xfrm>
+          <a:prstGeom prst="straightConnector1">
+            <a:avLst/>
+          </a:prstGeom>
+          <a:ln>
+            <a:headEnd type="arrow"/>
+            <a:tailEnd type="arrow"/>
+          </a:ln>
+        </p:spPr>
+        <p:style>
+          <a:lnRef idx="1">
+            <a:schemeClr val="accent1"/>
+          </a:lnRef>
+          <a:fillRef idx="0">
+            <a:schemeClr val="accent1"/>
+          </a:fillRef>
+          <a:effectRef idx="0">
+            <a:schemeClr val="accent1"/>
+          </a:effectRef>
+          <a:fontRef idx="minor">
+            <a:schemeClr val="tx1"/>
+          </a:fontRef>
+        </p:style>
+      </p:cxnSp>
+      <p:cxnSp>
+        <p:nvCxnSpPr>
+          <p:cNvPr id="119" name="Conector de seta reta 118"/>
+          <p:cNvCxnSpPr/>
+          <p:nvPr/>
+        </p:nvCxnSpPr>
+        <p:spPr>
+          <a:xfrm flipV="1">
+            <a:off x="4315621" y="5697252"/>
+            <a:ext cx="0" cy="208223"/>
+          </a:xfrm>
+          <a:prstGeom prst="straightConnector1">
+            <a:avLst/>
+          </a:prstGeom>
+          <a:ln>
+            <a:tailEnd type="arrow"/>
+          </a:ln>
+        </p:spPr>
+        <p:style>
+          <a:lnRef idx="1">
+            <a:schemeClr val="accent1"/>
+          </a:lnRef>
+          <a:fillRef idx="0">
+            <a:schemeClr val="accent1"/>
+          </a:fillRef>
+          <a:effectRef idx="0">
+            <a:schemeClr val="accent1"/>
+          </a:effectRef>
+          <a:fontRef idx="minor">
+            <a:schemeClr val="tx1"/>
+          </a:fontRef>
+        </p:style>
+      </p:cxnSp>
+      <p:cxnSp>
+        <p:nvCxnSpPr>
+          <p:cNvPr id="121" name="Conector de seta reta 120"/>
+          <p:cNvCxnSpPr/>
+          <p:nvPr/>
+        </p:nvCxnSpPr>
+        <p:spPr>
+          <a:xfrm flipV="1">
+            <a:off x="1559046" y="5697252"/>
+            <a:ext cx="0" cy="208223"/>
+          </a:xfrm>
+          <a:prstGeom prst="straightConnector1">
+            <a:avLst/>
+          </a:prstGeom>
+          <a:ln>
+            <a:tailEnd type="arrow"/>
+          </a:ln>
+        </p:spPr>
+        <p:style>
+          <a:lnRef idx="1">
+            <a:schemeClr val="accent1"/>
+          </a:lnRef>
+          <a:fillRef idx="0">
+            <a:schemeClr val="accent1"/>
+          </a:fillRef>
+          <a:effectRef idx="0">
+            <a:schemeClr val="accent1"/>
+          </a:effectRef>
+          <a:fontRef idx="minor">
+            <a:schemeClr val="tx1"/>
+          </a:fontRef>
+        </p:style>
+      </p:cxnSp>
+      <p:cxnSp>
+        <p:nvCxnSpPr>
+          <p:cNvPr id="139" name="Conector de seta reta 138"/>
+          <p:cNvCxnSpPr/>
+          <p:nvPr/>
+        </p:nvCxnSpPr>
+        <p:spPr>
+          <a:xfrm>
+            <a:off x="4662612" y="2780928"/>
+            <a:ext cx="1" cy="261309"/>
+          </a:xfrm>
+          <a:prstGeom prst="straightConnector1">
+            <a:avLst/>
+          </a:prstGeom>
+          <a:ln>
+            <a:tailEnd type="arrow"/>
+          </a:ln>
+        </p:spPr>
+        <p:style>
+          <a:lnRef idx="1">
+            <a:schemeClr val="accent1"/>
+          </a:lnRef>
+          <a:fillRef idx="0">
+            <a:schemeClr val="accent1"/>
+          </a:fillRef>
+          <a:effectRef idx="0">
+            <a:schemeClr val="accent1"/>
+          </a:effectRef>
+          <a:fontRef idx="minor">
+            <a:schemeClr val="tx1"/>
+          </a:fontRef>
+        </p:style>
+      </p:cxnSp>
+      <p:cxnSp>
+        <p:nvCxnSpPr>
+          <p:cNvPr id="151" name="Conector de seta reta 150"/>
+          <p:cNvCxnSpPr>
+            <a:stCxn id="88" idx="2"/>
+          </p:cNvCxnSpPr>
+          <p:nvPr/>
+        </p:nvCxnSpPr>
+        <p:spPr>
+          <a:xfrm>
+            <a:off x="4354799" y="2204865"/>
+            <a:ext cx="0" cy="288031"/>
+          </a:xfrm>
+          <a:prstGeom prst="straightConnector1">
+            <a:avLst/>
+          </a:prstGeom>
+          <a:ln>
+            <a:tailEnd type="arrow"/>
+          </a:ln>
+        </p:spPr>
+        <p:style>
+          <a:lnRef idx="1">
+            <a:schemeClr val="accent1"/>
+          </a:lnRef>
+          <a:fillRef idx="0">
+            <a:schemeClr val="accent1"/>
+          </a:fillRef>
+          <a:effectRef idx="0">
+            <a:schemeClr val="accent1"/>
+          </a:effectRef>
+          <a:fontRef idx="minor">
+            <a:schemeClr val="tx1"/>
+          </a:fontRef>
+        </p:style>
+      </p:cxnSp>
+      <p:cxnSp>
+        <p:nvCxnSpPr>
+          <p:cNvPr id="153" name="Conector de seta reta 152"/>
+          <p:cNvCxnSpPr>
+            <a:endCxn id="87" idx="2"/>
+          </p:cNvCxnSpPr>
+          <p:nvPr/>
+        </p:nvCxnSpPr>
+        <p:spPr>
+          <a:xfrm flipV="1">
+            <a:off x="1850641" y="2204866"/>
+            <a:ext cx="0" cy="288032"/>
+          </a:xfrm>
+          <a:prstGeom prst="straightConnector1">
+            <a:avLst/>
+          </a:prstGeom>
+          <a:ln>
+            <a:tailEnd type="arrow"/>
+          </a:ln>
+        </p:spPr>
+        <p:style>
+          <a:lnRef idx="1">
+            <a:schemeClr val="accent1"/>
+          </a:lnRef>
+          <a:fillRef idx="0">
+            <a:schemeClr val="accent1"/>
+          </a:fillRef>
+          <a:effectRef idx="0">
+            <a:schemeClr val="accent1"/>
+          </a:effectRef>
+          <a:fontRef idx="minor">
+            <a:schemeClr val="tx1"/>
+          </a:fontRef>
+        </p:style>
+      </p:cxnSp>
+      <p:cxnSp>
+        <p:nvCxnSpPr>
+          <p:cNvPr id="155" name="Conector de seta reta 154"/>
+          <p:cNvCxnSpPr>
+            <a:endCxn id="88" idx="0"/>
+          </p:cNvCxnSpPr>
+          <p:nvPr/>
+        </p:nvCxnSpPr>
+        <p:spPr>
+          <a:xfrm>
+            <a:off x="4354799" y="1206044"/>
+            <a:ext cx="0" cy="327199"/>
+          </a:xfrm>
+          <a:prstGeom prst="straightConnector1">
+            <a:avLst/>
+          </a:prstGeom>
+          <a:ln>
+            <a:tailEnd type="arrow"/>
+          </a:ln>
+        </p:spPr>
+        <p:style>
+          <a:lnRef idx="1">
+            <a:schemeClr val="accent1"/>
+          </a:lnRef>
+          <a:fillRef idx="0">
+            <a:schemeClr val="accent1"/>
+          </a:fillRef>
+          <a:effectRef idx="0">
+            <a:schemeClr val="accent1"/>
+          </a:effectRef>
+          <a:fontRef idx="minor">
+            <a:schemeClr val="tx1"/>
+          </a:fontRef>
+        </p:style>
+      </p:cxnSp>
+      <p:cxnSp>
+        <p:nvCxnSpPr>
+          <p:cNvPr id="157" name="Conector de seta reta 156"/>
+          <p:cNvCxnSpPr>
+            <a:stCxn id="87" idx="0"/>
+          </p:cNvCxnSpPr>
+          <p:nvPr/>
+        </p:nvCxnSpPr>
+        <p:spPr>
+          <a:xfrm flipV="1">
+            <a:off x="1850641" y="1206046"/>
+            <a:ext cx="0" cy="339838"/>
+          </a:xfrm>
+          <a:prstGeom prst="straightConnector1">
+            <a:avLst/>
+          </a:prstGeom>
+          <a:ln>
+            <a:tailEnd type="arrow"/>
+          </a:ln>
+        </p:spPr>
+        <p:style>
+          <a:lnRef idx="1">
+            <a:schemeClr val="accent1"/>
+          </a:lnRef>
+          <a:fillRef idx="0">
+            <a:schemeClr val="accent1"/>
+          </a:fillRef>
+          <a:effectRef idx="0">
+            <a:schemeClr val="accent1"/>
+          </a:effectRef>
+          <a:fontRef idx="minor">
+            <a:schemeClr val="tx1"/>
+          </a:fontRef>
+        </p:style>
+      </p:cxnSp>
+      <p:cxnSp>
+        <p:nvCxnSpPr>
+          <p:cNvPr id="166" name="Conector de seta reta 165"/>
+          <p:cNvCxnSpPr>
+            <a:stCxn id="60" idx="0"/>
+          </p:cNvCxnSpPr>
+          <p:nvPr/>
+        </p:nvCxnSpPr>
+        <p:spPr>
+          <a:xfrm flipV="1">
+            <a:off x="2575627" y="2780928"/>
+            <a:ext cx="0" cy="293311"/>
+          </a:xfrm>
+          <a:prstGeom prst="straightConnector1">
+            <a:avLst/>
+          </a:prstGeom>
+          <a:ln>
+            <a:tailEnd type="arrow"/>
+          </a:ln>
+        </p:spPr>
+        <p:style>
+          <a:lnRef idx="1">
+            <a:schemeClr val="accent1"/>
+          </a:lnRef>
+          <a:fillRef idx="0">
+            <a:schemeClr val="accent1"/>
+          </a:fillRef>
+          <a:effectRef idx="0">
+            <a:schemeClr val="accent1"/>
+          </a:effectRef>
+          <a:fontRef idx="minor">
+            <a:schemeClr val="tx1"/>
+          </a:fontRef>
+        </p:style>
+      </p:cxnSp>
+      <p:cxnSp>
+        <p:nvCxnSpPr>
+          <p:cNvPr id="168" name="Conector de seta reta 167"/>
+          <p:cNvCxnSpPr/>
+          <p:nvPr/>
+        </p:nvCxnSpPr>
+        <p:spPr>
+          <a:xfrm flipV="1">
+            <a:off x="4729692" y="3492286"/>
+            <a:ext cx="0" cy="224746"/>
+          </a:xfrm>
+          <a:prstGeom prst="straightConnector1">
+            <a:avLst/>
+          </a:prstGeom>
+          <a:ln>
+            <a:tailEnd type="arrow"/>
+          </a:ln>
+        </p:spPr>
+        <p:style>
+          <a:lnRef idx="1">
+            <a:schemeClr val="accent1"/>
+          </a:lnRef>
+          <a:fillRef idx="0">
+            <a:schemeClr val="accent1"/>
+          </a:fillRef>
+          <a:effectRef idx="0">
+            <a:schemeClr val="accent1"/>
+          </a:effectRef>
+          <a:fontRef idx="minor">
+            <a:schemeClr val="tx1"/>
+          </a:fontRef>
+        </p:style>
+      </p:cxnSp>
+      <p:cxnSp>
+        <p:nvCxnSpPr>
+          <p:cNvPr id="170" name="Conector de seta reta 169"/>
+          <p:cNvCxnSpPr>
+            <a:stCxn id="62" idx="1"/>
+          </p:cNvCxnSpPr>
+          <p:nvPr/>
+        </p:nvCxnSpPr>
+        <p:spPr>
+          <a:xfrm flipH="1">
+            <a:off x="3419872" y="3283263"/>
+            <a:ext cx="459401" cy="0"/>
+          </a:xfrm>
+          <a:prstGeom prst="straightConnector1">
+            <a:avLst/>
+          </a:prstGeom>
+          <a:ln>
+            <a:tailEnd type="arrow"/>
+          </a:ln>
+        </p:spPr>
+        <p:style>
+          <a:lnRef idx="1">
+            <a:schemeClr val="accent1"/>
+          </a:lnRef>
+          <a:fillRef idx="0">
+            <a:schemeClr val="accent1"/>
+          </a:fillRef>
+          <a:effectRef idx="0">
+            <a:schemeClr val="accent1"/>
+          </a:effectRef>
+          <a:fontRef idx="minor">
+            <a:schemeClr val="tx1"/>
+          </a:fontRef>
+        </p:style>
+      </p:cxnSp>
+      <p:cxnSp>
+        <p:nvCxnSpPr>
+          <p:cNvPr id="175" name="Conector de seta reta 174"/>
+          <p:cNvCxnSpPr/>
+          <p:nvPr/>
+        </p:nvCxnSpPr>
+        <p:spPr>
+          <a:xfrm>
+            <a:off x="1559046" y="2780928"/>
+            <a:ext cx="0" cy="936104"/>
+          </a:xfrm>
+          <a:prstGeom prst="straightConnector1">
+            <a:avLst/>
+          </a:prstGeom>
+          <a:ln>
+            <a:tailEnd type="arrow"/>
+          </a:ln>
+        </p:spPr>
+        <p:style>
+          <a:lnRef idx="1">
+            <a:schemeClr val="accent1"/>
+          </a:lnRef>
+          <a:fillRef idx="0">
+            <a:schemeClr val="accent1"/>
+          </a:fillRef>
+          <a:effectRef idx="0">
+            <a:schemeClr val="accent1"/>
+          </a:effectRef>
+          <a:fontRef idx="minor">
+            <a:schemeClr val="tx1"/>
+          </a:fontRef>
+        </p:style>
+      </p:cxnSp>
+      <p:sp>
+        <p:nvSpPr>
+          <p:cNvPr id="184" name="CaixaDeTexto 183"/>
+          <p:cNvSpPr txBox="1"/>
+          <p:nvPr/>
+        </p:nvSpPr>
+        <p:spPr>
+          <a:xfrm>
+            <a:off x="2612573" y="50431"/>
+            <a:ext cx="764055" cy="338554"/>
+          </a:xfrm>
+          <a:prstGeom prst="rect">
+            <a:avLst/>
+          </a:prstGeom>
+          <a:noFill/>
+        </p:spPr>
+        <p:txBody>
+          <a:bodyPr wrap="none" rtlCol="0">
+            <a:spAutoFit/>
+          </a:bodyPr>
+          <a:lstStyle/>
+          <a:p>
+            <a:r>
+              <a:rPr lang="pt-BR" sz="1600" dirty="0" smtClean="0"/>
+              <a:t>Cliente</a:t>
+            </a:r>
+            <a:endParaRPr lang="pt-BR" sz="1600" dirty="0"/>
+          </a:p>
+        </p:txBody>
+      </p:sp>
+      <p:cxnSp>
+        <p:nvCxnSpPr>
+          <p:cNvPr id="190" name="Conector de seta reta 189"/>
+          <p:cNvCxnSpPr>
+            <a:stCxn id="58" idx="2"/>
+          </p:cNvCxnSpPr>
+          <p:nvPr/>
+        </p:nvCxnSpPr>
+        <p:spPr>
+          <a:xfrm flipH="1" flipV="1">
+            <a:off x="3029701" y="4347091"/>
+            <a:ext cx="2314" cy="306045"/>
+          </a:xfrm>
+          <a:prstGeom prst="straightConnector1">
+            <a:avLst/>
+          </a:prstGeom>
+          <a:ln>
+            <a:headEnd type="arrow"/>
+            <a:tailEnd type="arrow"/>
+          </a:ln>
+        </p:spPr>
+        <p:style>
+          <a:lnRef idx="1">
+            <a:schemeClr val="accent1"/>
+          </a:lnRef>
+          <a:fillRef idx="0">
+            <a:schemeClr val="accent1"/>
+          </a:fillRef>
+          <a:effectRef idx="0">
+            <a:schemeClr val="accent1"/>
+          </a:effectRef>
+          <a:fontRef idx="minor">
+            <a:schemeClr val="tx1"/>
+          </a:fontRef>
+        </p:style>
+      </p:cxnSp>
+    </p:spTree>
+    <p:extLst>
+      <p:ext uri="{BB962C8B-B14F-4D97-AF65-F5344CB8AC3E}">
+        <p14:creationId xmlns:p14="http://schemas.microsoft.com/office/powerpoint/2010/main" val="1337685489"/>
+      </p:ext>
+    </p:extLst>
+  </p:cSld>
+  <p:clrMapOvr>
+    <a:masterClrMapping/>
+  </p:clrMapOvr>
+  <p:timing>
+    <p:tnLst>
+      <p:par>
+        <p:cTn id="1" dur="indefinite" restart="never" nodeType="tmRoot"/>
+      </p:par>
+    </p:tnLst>
+  </p:timing>
 </p:sld>
 </file>
 

</xml_diff>